<commit_message>
Fixing stuff after the presentation
</commit_message>
<xml_diff>
--- a/presentation/DARYLL.pptx
+++ b/presentation/DARYLL.pptx
@@ -7,8 +7,8 @@
   <p:sldIdLst>
     <p:sldId id="256" r:id="rId2"/>
     <p:sldId id="257" r:id="rId3"/>
-    <p:sldId id="258" r:id="rId4"/>
-    <p:sldId id="259" r:id="rId5"/>
+    <p:sldId id="259" r:id="rId4"/>
+    <p:sldId id="258" r:id="rId5"/>
     <p:sldId id="260" r:id="rId6"/>
     <p:sldId id="268" r:id="rId7"/>
     <p:sldId id="262" r:id="rId8"/>
@@ -132,10 +132,6 @@
     </p:ext>
   </p:extLst>
 </p:presentation>
-</file>
-
-<file path=ppt/revisionInfo.xml><?xml version="1.0" encoding="utf-8"?>
-<p1510:revInfo xmlns:a="http://schemas.openxmlformats.org/drawingml/2006/main" xmlns:r="http://schemas.openxmlformats.org/officeDocument/2006/relationships" xmlns:p1510="http://schemas.microsoft.com/office/powerpoint/2015/10/main"/>
 </file>
 
 <file path=ppt/slideLayouts/slideLayout1.xml><?xml version="1.0" encoding="utf-8"?>
@@ -932,7 +928,7 @@
           <a:p>
             <a:fld id="{E9776A4E-8259-402F-AF2F-22586C70175D}" type="datetimeFigureOut">
               <a:rPr lang="fr-CH" smtClean="0"/>
-              <a:t>18.04.2018</a:t>
+              <a:t>19.04.2018</a:t>
             </a:fld>
             <a:endParaRPr lang="fr-CH"/>
           </a:p>
@@ -1183,7 +1179,7 @@
           <a:p>
             <a:fld id="{E9776A4E-8259-402F-AF2F-22586C70175D}" type="datetimeFigureOut">
               <a:rPr lang="fr-CH" smtClean="0"/>
-              <a:t>18.04.2018</a:t>
+              <a:t>19.04.2018</a:t>
             </a:fld>
             <a:endParaRPr lang="fr-CH"/>
           </a:p>
@@ -1497,7 +1493,7 @@
           <a:p>
             <a:fld id="{E9776A4E-8259-402F-AF2F-22586C70175D}" type="datetimeFigureOut">
               <a:rPr lang="fr-CH" smtClean="0"/>
-              <a:t>18.04.2018</a:t>
+              <a:t>19.04.2018</a:t>
             </a:fld>
             <a:endParaRPr lang="fr-CH"/>
           </a:p>
@@ -1830,7 +1826,7 @@
           <a:p>
             <a:fld id="{E9776A4E-8259-402F-AF2F-22586C70175D}" type="datetimeFigureOut">
               <a:rPr lang="fr-CH" smtClean="0"/>
-              <a:t>18.04.2018</a:t>
+              <a:t>19.04.2018</a:t>
             </a:fld>
             <a:endParaRPr lang="fr-CH"/>
           </a:p>
@@ -2144,7 +2140,7 @@
           <a:p>
             <a:fld id="{E9776A4E-8259-402F-AF2F-22586C70175D}" type="datetimeFigureOut">
               <a:rPr lang="fr-CH" smtClean="0"/>
-              <a:t>18.04.2018</a:t>
+              <a:t>19.04.2018</a:t>
             </a:fld>
             <a:endParaRPr lang="fr-CH"/>
           </a:p>
@@ -2537,7 +2533,7 @@
           <a:p>
             <a:fld id="{E9776A4E-8259-402F-AF2F-22586C70175D}" type="datetimeFigureOut">
               <a:rPr lang="fr-CH" smtClean="0"/>
-              <a:t>18.04.2018</a:t>
+              <a:t>19.04.2018</a:t>
             </a:fld>
             <a:endParaRPr lang="fr-CH"/>
           </a:p>
@@ -2707,7 +2703,7 @@
           <a:p>
             <a:fld id="{E9776A4E-8259-402F-AF2F-22586C70175D}" type="datetimeFigureOut">
               <a:rPr lang="fr-CH" smtClean="0"/>
-              <a:t>18.04.2018</a:t>
+              <a:t>19.04.2018</a:t>
             </a:fld>
             <a:endParaRPr lang="fr-CH"/>
           </a:p>
@@ -2887,7 +2883,7 @@
           <a:p>
             <a:fld id="{E9776A4E-8259-402F-AF2F-22586C70175D}" type="datetimeFigureOut">
               <a:rPr lang="fr-CH" smtClean="0"/>
-              <a:t>18.04.2018</a:t>
+              <a:t>19.04.2018</a:t>
             </a:fld>
             <a:endParaRPr lang="fr-CH"/>
           </a:p>
@@ -3057,7 +3053,7 @@
           <a:p>
             <a:fld id="{E9776A4E-8259-402F-AF2F-22586C70175D}" type="datetimeFigureOut">
               <a:rPr lang="fr-CH" smtClean="0"/>
-              <a:t>18.04.2018</a:t>
+              <a:t>19.04.2018</a:t>
             </a:fld>
             <a:endParaRPr lang="fr-CH"/>
           </a:p>
@@ -3304,7 +3300,7 @@
           <a:p>
             <a:fld id="{E9776A4E-8259-402F-AF2F-22586C70175D}" type="datetimeFigureOut">
               <a:rPr lang="fr-CH" smtClean="0"/>
-              <a:t>18.04.2018</a:t>
+              <a:t>19.04.2018</a:t>
             </a:fld>
             <a:endParaRPr lang="fr-CH"/>
           </a:p>
@@ -3601,7 +3597,7 @@
           <a:p>
             <a:fld id="{E9776A4E-8259-402F-AF2F-22586C70175D}" type="datetimeFigureOut">
               <a:rPr lang="fr-CH" smtClean="0"/>
-              <a:t>18.04.2018</a:t>
+              <a:t>19.04.2018</a:t>
             </a:fld>
             <a:endParaRPr lang="fr-CH"/>
           </a:p>
@@ -3980,7 +3976,7 @@
           <a:p>
             <a:fld id="{E9776A4E-8259-402F-AF2F-22586C70175D}" type="datetimeFigureOut">
               <a:rPr lang="fr-CH" smtClean="0"/>
-              <a:t>18.04.2018</a:t>
+              <a:t>19.04.2018</a:t>
             </a:fld>
             <a:endParaRPr lang="fr-CH"/>
           </a:p>
@@ -4103,7 +4099,7 @@
           <a:p>
             <a:fld id="{E9776A4E-8259-402F-AF2F-22586C70175D}" type="datetimeFigureOut">
               <a:rPr lang="fr-CH" smtClean="0"/>
-              <a:t>18.04.2018</a:t>
+              <a:t>19.04.2018</a:t>
             </a:fld>
             <a:endParaRPr lang="fr-CH"/>
           </a:p>
@@ -4198,7 +4194,7 @@
           <a:p>
             <a:fld id="{E9776A4E-8259-402F-AF2F-22586C70175D}" type="datetimeFigureOut">
               <a:rPr lang="fr-CH" smtClean="0"/>
-              <a:t>18.04.2018</a:t>
+              <a:t>19.04.2018</a:t>
             </a:fld>
             <a:endParaRPr lang="fr-CH"/>
           </a:p>
@@ -4453,7 +4449,7 @@
           <a:p>
             <a:fld id="{E9776A4E-8259-402F-AF2F-22586C70175D}" type="datetimeFigureOut">
               <a:rPr lang="fr-CH" smtClean="0"/>
-              <a:t>18.04.2018</a:t>
+              <a:t>19.04.2018</a:t>
             </a:fld>
             <a:endParaRPr lang="fr-CH"/>
           </a:p>
@@ -4716,7 +4712,7 @@
           <a:p>
             <a:fld id="{E9776A4E-8259-402F-AF2F-22586C70175D}" type="datetimeFigureOut">
               <a:rPr lang="fr-CH" smtClean="0"/>
-              <a:t>18.04.2018</a:t>
+              <a:t>19.04.2018</a:t>
             </a:fld>
             <a:endParaRPr lang="fr-CH"/>
           </a:p>
@@ -5535,7 +5531,7 @@
           <a:p>
             <a:fld id="{E9776A4E-8259-402F-AF2F-22586C70175D}" type="datetimeFigureOut">
               <a:rPr lang="fr-CH" smtClean="0"/>
-              <a:t>18.04.2018</a:t>
+              <a:t>19.04.2018</a:t>
             </a:fld>
             <a:endParaRPr lang="fr-CH"/>
           </a:p>
@@ -6173,23 +6169,7 @@
                   <a:schemeClr val="tx2"/>
                 </a:solidFill>
               </a:rPr>
-              <a:t>Yohann Meyer, </a:t>
-            </a:r>
-            <a:r>
-              <a:rPr lang="fr-CH" sz="2100" dirty="0" err="1">
-                <a:solidFill>
-                  <a:schemeClr val="tx2"/>
-                </a:solidFill>
-              </a:rPr>
-              <a:t>Loic</a:t>
-            </a:r>
-            <a:r>
-              <a:rPr lang="fr-CH" sz="2100" dirty="0">
-                <a:solidFill>
-                  <a:schemeClr val="tx2"/>
-                </a:solidFill>
-              </a:rPr>
-              <a:t> </a:t>
+              <a:t>Yohann Meyer, Loïc </a:t>
             </a:r>
             <a:r>
               <a:rPr lang="fr-CH" sz="2100" dirty="0" err="1">
@@ -6205,23 +6185,7 @@
                   <a:schemeClr val="tx2"/>
                 </a:solidFill>
               </a:rPr>
-              <a:t>, </a:t>
-            </a:r>
-            <a:r>
-              <a:rPr lang="fr-CH" sz="2100" dirty="0" err="1">
-                <a:solidFill>
-                  <a:schemeClr val="tx2"/>
-                </a:solidFill>
-              </a:rPr>
-              <a:t>Labinot</a:t>
-            </a:r>
-            <a:r>
-              <a:rPr lang="fr-CH" sz="2100" dirty="0">
-                <a:solidFill>
-                  <a:schemeClr val="tx2"/>
-                </a:solidFill>
-              </a:rPr>
-              <a:t> </a:t>
+              <a:t>, Labinot </a:t>
             </a:r>
             <a:r>
               <a:rPr lang="fr-CH" sz="2100" dirty="0" err="1">
@@ -6515,13 +6479,8 @@
             <a:pPr lvl="1"/>
             <a:r>
               <a:rPr lang="fr-CH" dirty="0"/>
-              <a:t>Facteur humain : Concentration, </a:t>
-            </a:r>
-            <a:r>
-              <a:rPr lang="fr-CH" dirty="0" err="1"/>
-              <a:t>prioritisation</a:t>
-            </a:r>
-            <a:endParaRPr lang="fr-CH" dirty="0"/>
+              <a:t>Facteur humain : Concentration, priorisation</a:t>
+            </a:r>
           </a:p>
         </p:txBody>
       </p:sp>
@@ -6685,7 +6644,7 @@
           <a:p>
             <a:r>
               <a:rPr lang="fr-CH" dirty="0"/>
-              <a:t>A partir d’un horaires → obtenir des salles libres</a:t>
+              <a:t>À partir d’un horaire → obtenir des salles libres</a:t>
             </a:r>
           </a:p>
           <a:p>
@@ -6694,7 +6653,7 @@
           <a:p>
             <a:r>
               <a:rPr lang="fr-CH" dirty="0"/>
-              <a:t>A partir d’une salle → obtenir ses horaires libres</a:t>
+              <a:t>À partir d’une salle → obtenir ses horaires libres</a:t>
             </a:r>
           </a:p>
         </p:txBody>
@@ -6762,6 +6721,297 @@
           <p:cNvPr id="2" name="Titre 1">
             <a:extLst>
               <a:ext uri="{FF2B5EF4-FFF2-40B4-BE49-F238E27FC236}">
+                <a16:creationId xmlns:a16="http://schemas.microsoft.com/office/drawing/2014/main" id="{D0449A1E-829E-4083-9EA0-63A6EA8156DF}"/>
+              </a:ext>
+            </a:extLst>
+          </p:cNvPr>
+          <p:cNvSpPr>
+            <a:spLocks noGrp="1"/>
+          </p:cNvSpPr>
+          <p:nvPr>
+            <p:ph type="title"/>
+          </p:nvPr>
+        </p:nvSpPr>
+        <p:spPr/>
+        <p:txBody>
+          <a:bodyPr/>
+          <a:lstStyle/>
+          <a:p>
+            <a:r>
+              <a:rPr lang="fr-CH" dirty="0"/>
+              <a:t>Modèle de données utilisé</a:t>
+            </a:r>
+          </a:p>
+        </p:txBody>
+      </p:sp>
+      <p:graphicFrame>
+        <p:nvGraphicFramePr>
+          <p:cNvPr id="4" name="Espace réservé du contenu 3">
+            <a:extLst>
+              <a:ext uri="{FF2B5EF4-FFF2-40B4-BE49-F238E27FC236}">
+                <a16:creationId xmlns:a16="http://schemas.microsoft.com/office/drawing/2014/main" id="{62F2D78C-A8DE-47F9-9F2F-DC4F417F6C12}"/>
+              </a:ext>
+            </a:extLst>
+          </p:cNvPr>
+          <p:cNvGraphicFramePr>
+            <a:graphicFrameLocks noGrp="1"/>
+          </p:cNvGraphicFramePr>
+          <p:nvPr>
+            <p:ph idx="1"/>
+            <p:extLst>
+              <p:ext uri="{D42A27DB-BD31-4B8C-83A1-F6EECF244321}">
+                <p14:modId xmlns:p14="http://schemas.microsoft.com/office/powerpoint/2010/main" val="3249671903"/>
+              </p:ext>
+            </p:extLst>
+          </p:nvPr>
+        </p:nvGraphicFramePr>
+        <p:xfrm>
+          <a:off x="677068" y="2348750"/>
+          <a:ext cx="6348414" cy="3240000"/>
+        </p:xfrm>
+        <a:graphic>
+          <a:graphicData uri="http://schemas.openxmlformats.org/drawingml/2006/table">
+            <a:tbl>
+              <a:tblPr bandRow="1">
+                <a:tableStyleId>{5C22544A-7EE6-4342-B048-85BDC9FD1C3A}</a:tableStyleId>
+              </a:tblPr>
+              <a:tblGrid>
+                <a:gridCol w="3174207">
+                  <a:extLst>
+                    <a:ext uri="{9D8B030D-6E8A-4147-A177-3AD203B41FA5}">
+                      <a16:colId xmlns:a16="http://schemas.microsoft.com/office/drawing/2014/main" val="2752126569"/>
+                    </a:ext>
+                  </a:extLst>
+                </a:gridCol>
+                <a:gridCol w="3174207">
+                  <a:extLst>
+                    <a:ext uri="{9D8B030D-6E8A-4147-A177-3AD203B41FA5}">
+                      <a16:colId xmlns:a16="http://schemas.microsoft.com/office/drawing/2014/main" val="1997517721"/>
+                    </a:ext>
+                  </a:extLst>
+                </a:gridCol>
+              </a:tblGrid>
+              <a:tr h="648000">
+                <a:tc>
+                  <a:txBody>
+                    <a:bodyPr/>
+                    <a:lstStyle/>
+                    <a:p>
+                      <a:pPr algn="l"/>
+                      <a:r>
+                        <a:rPr lang="fr-CH" b="1" dirty="0"/>
+                        <a:t>Calendrier</a:t>
+                      </a:r>
+                    </a:p>
+                    <a:p>
+                      <a:pPr algn="l"/>
+                      <a:r>
+                        <a:rPr lang="fr-CH" b="1" dirty="0"/>
+                        <a:t>(Raw data)</a:t>
+                      </a:r>
+                    </a:p>
+                  </a:txBody>
+                  <a:tcPr anchor="ctr"/>
+                </a:tc>
+                <a:tc>
+                  <a:txBody>
+                    <a:bodyPr/>
+                    <a:lstStyle/>
+                    <a:p>
+                      <a:pPr algn="r"/>
+                      <a:r>
+                        <a:rPr lang="fr-CH" dirty="0"/>
+                        <a:t>ICS</a:t>
+                      </a:r>
+                    </a:p>
+                  </a:txBody>
+                  <a:tcPr anchor="ctr"/>
+                </a:tc>
+                <a:extLst>
+                  <a:ext uri="{0D108BD9-81ED-4DB2-BD59-A6C34878D82A}">
+                    <a16:rowId xmlns:a16="http://schemas.microsoft.com/office/drawing/2014/main" val="3692782782"/>
+                  </a:ext>
+                </a:extLst>
+              </a:tr>
+              <a:tr h="648000">
+                <a:tc>
+                  <a:txBody>
+                    <a:bodyPr/>
+                    <a:lstStyle/>
+                    <a:p>
+                      <a:pPr algn="l"/>
+                      <a:r>
+                        <a:rPr lang="fr-CH" b="1" dirty="0"/>
+                        <a:t>Communication client serveur</a:t>
+                      </a:r>
+                    </a:p>
+                  </a:txBody>
+                  <a:tcPr anchor="ctr"/>
+                </a:tc>
+                <a:tc>
+                  <a:txBody>
+                    <a:bodyPr/>
+                    <a:lstStyle/>
+                    <a:p>
+                      <a:pPr algn="r"/>
+                      <a:r>
+                        <a:rPr lang="fr-CH" dirty="0"/>
+                        <a:t>JSON</a:t>
+                      </a:r>
+                    </a:p>
+                  </a:txBody>
+                  <a:tcPr anchor="ctr"/>
+                </a:tc>
+                <a:extLst>
+                  <a:ext uri="{0D108BD9-81ED-4DB2-BD59-A6C34878D82A}">
+                    <a16:rowId xmlns:a16="http://schemas.microsoft.com/office/drawing/2014/main" val="2593279772"/>
+                  </a:ext>
+                </a:extLst>
+              </a:tr>
+              <a:tr h="648000">
+                <a:tc>
+                  <a:txBody>
+                    <a:bodyPr/>
+                    <a:lstStyle/>
+                    <a:p>
+                      <a:pPr algn="l"/>
+                      <a:r>
+                        <a:rPr lang="fr-CH" b="1" dirty="0"/>
+                        <a:t>Interface graphique</a:t>
+                      </a:r>
+                    </a:p>
+                  </a:txBody>
+                  <a:tcPr anchor="ctr"/>
+                </a:tc>
+                <a:tc>
+                  <a:txBody>
+                    <a:bodyPr/>
+                    <a:lstStyle/>
+                    <a:p>
+                      <a:pPr algn="r"/>
+                      <a:r>
+                        <a:rPr lang="fr-CH" dirty="0"/>
+                        <a:t>FXML</a:t>
+                      </a:r>
+                    </a:p>
+                  </a:txBody>
+                  <a:tcPr anchor="ctr"/>
+                </a:tc>
+                <a:extLst>
+                  <a:ext uri="{0D108BD9-81ED-4DB2-BD59-A6C34878D82A}">
+                    <a16:rowId xmlns:a16="http://schemas.microsoft.com/office/drawing/2014/main" val="2799125449"/>
+                  </a:ext>
+                </a:extLst>
+              </a:tr>
+              <a:tr h="648000">
+                <a:tc>
+                  <a:txBody>
+                    <a:bodyPr/>
+                    <a:lstStyle/>
+                    <a:p>
+                      <a:pPr algn="l"/>
+                      <a:r>
+                        <a:rPr lang="fr-CH" b="1" dirty="0"/>
+                        <a:t>Impression des données</a:t>
+                      </a:r>
+                    </a:p>
+                  </a:txBody>
+                  <a:tcPr anchor="ctr"/>
+                </a:tc>
+                <a:tc>
+                  <a:txBody>
+                    <a:bodyPr/>
+                    <a:lstStyle/>
+                    <a:p>
+                      <a:pPr algn="r"/>
+                      <a:r>
+                        <a:rPr lang="fr-CH" dirty="0"/>
+                        <a:t>TXT</a:t>
+                      </a:r>
+                    </a:p>
+                  </a:txBody>
+                  <a:tcPr anchor="ctr"/>
+                </a:tc>
+                <a:extLst>
+                  <a:ext uri="{0D108BD9-81ED-4DB2-BD59-A6C34878D82A}">
+                    <a16:rowId xmlns:a16="http://schemas.microsoft.com/office/drawing/2014/main" val="1669240110"/>
+                  </a:ext>
+                </a:extLst>
+              </a:tr>
+              <a:tr h="648000">
+                <a:tc>
+                  <a:txBody>
+                    <a:bodyPr/>
+                    <a:lstStyle/>
+                    <a:p>
+                      <a:pPr algn="l"/>
+                      <a:r>
+                        <a:rPr lang="fr-CH" b="1" dirty="0"/>
+                        <a:t>Plans du bâtiment</a:t>
+                      </a:r>
+                    </a:p>
+                  </a:txBody>
+                  <a:tcPr anchor="ctr"/>
+                </a:tc>
+                <a:tc>
+                  <a:txBody>
+                    <a:bodyPr/>
+                    <a:lstStyle/>
+                    <a:p>
+                      <a:pPr algn="r"/>
+                      <a:r>
+                        <a:rPr lang="fr-CH" dirty="0"/>
+                        <a:t>SVG</a:t>
+                      </a:r>
+                    </a:p>
+                  </a:txBody>
+                  <a:tcPr anchor="ctr"/>
+                </a:tc>
+                <a:extLst>
+                  <a:ext uri="{0D108BD9-81ED-4DB2-BD59-A6C34878D82A}">
+                    <a16:rowId xmlns:a16="http://schemas.microsoft.com/office/drawing/2014/main" val="1357869192"/>
+                  </a:ext>
+                </a:extLst>
+              </a:tr>
+            </a:tbl>
+          </a:graphicData>
+        </a:graphic>
+      </p:graphicFrame>
+    </p:spTree>
+    <p:extLst>
+      <p:ext uri="{BB962C8B-B14F-4D97-AF65-F5344CB8AC3E}">
+        <p14:creationId xmlns:p14="http://schemas.microsoft.com/office/powerpoint/2010/main" val="2397979562"/>
+      </p:ext>
+    </p:extLst>
+  </p:cSld>
+  <p:clrMapOvr>
+    <a:masterClrMapping/>
+  </p:clrMapOvr>
+</p:sld>
+</file>
+
+<file path=ppt/slides/slide4.xml><?xml version="1.0" encoding="utf-8"?>
+<p:sld xmlns:a="http://schemas.openxmlformats.org/drawingml/2006/main" xmlns:r="http://schemas.openxmlformats.org/officeDocument/2006/relationships" xmlns:p="http://schemas.openxmlformats.org/presentationml/2006/main">
+  <p:cSld>
+    <p:spTree>
+      <p:nvGrpSpPr>
+        <p:cNvPr id="1" name=""/>
+        <p:cNvGrpSpPr/>
+        <p:nvPr/>
+      </p:nvGrpSpPr>
+      <p:grpSpPr>
+        <a:xfrm>
+          <a:off x="0" y="0"/>
+          <a:ext cx="0" cy="0"/>
+          <a:chOff x="0" y="0"/>
+          <a:chExt cx="0" cy="0"/>
+        </a:xfrm>
+      </p:grpSpPr>
+      <p:sp>
+        <p:nvSpPr>
+          <p:cNvPr id="2" name="Titre 1">
+            <a:extLst>
+              <a:ext uri="{FF2B5EF4-FFF2-40B4-BE49-F238E27FC236}">
                 <a16:creationId xmlns:a16="http://schemas.microsoft.com/office/drawing/2014/main" id="{A81548B5-9027-4407-9FB5-DF873FA65B77}"/>
               </a:ext>
             </a:extLst>
@@ -6803,14 +7053,14 @@
             <p:ph idx="1"/>
             <p:extLst>
               <p:ext uri="{D42A27DB-BD31-4B8C-83A1-F6EECF244321}">
-                <p14:modId xmlns:p14="http://schemas.microsoft.com/office/powerpoint/2010/main" val="341489111"/>
+                <p14:modId xmlns:p14="http://schemas.microsoft.com/office/powerpoint/2010/main" val="1991006490"/>
               </p:ext>
             </p:extLst>
           </p:nvPr>
         </p:nvGraphicFramePr>
         <p:xfrm>
-          <a:off x="677068" y="2313940"/>
-          <a:ext cx="6348414" cy="3276000"/>
+          <a:off x="388883" y="2313940"/>
+          <a:ext cx="6636600" cy="3276000"/>
         </p:xfrm>
         <a:graphic>
           <a:graphicData uri="http://schemas.openxmlformats.org/drawingml/2006/table">
@@ -6819,14 +7069,14 @@
                 <a:tableStyleId>{5C22544A-7EE6-4342-B048-85BDC9FD1C3A}</a:tableStyleId>
               </a:tblPr>
               <a:tblGrid>
-                <a:gridCol w="3174207">
+                <a:gridCol w="3318300">
                   <a:extLst>
                     <a:ext uri="{9D8B030D-6E8A-4147-A177-3AD203B41FA5}">
                       <a16:colId xmlns:a16="http://schemas.microsoft.com/office/drawing/2014/main" val="1002630536"/>
                     </a:ext>
                   </a:extLst>
                 </a:gridCol>
-                <a:gridCol w="3174207">
+                <a:gridCol w="3318300">
                   <a:extLst>
                     <a:ext uri="{9D8B030D-6E8A-4147-A177-3AD203B41FA5}">
                       <a16:colId xmlns:a16="http://schemas.microsoft.com/office/drawing/2014/main" val="3871202572"/>
@@ -6841,7 +7091,7 @@
                     <a:lstStyle/>
                     <a:p>
                       <a:r>
-                        <a:rPr lang="fr-CH" dirty="0"/>
+                        <a:rPr lang="fr-CH" b="1" dirty="0"/>
                         <a:t>Langage</a:t>
                       </a:r>
                     </a:p>
@@ -6875,7 +7125,7 @@
                     <a:lstStyle/>
                     <a:p>
                       <a:r>
-                        <a:rPr lang="fr-CH" dirty="0"/>
+                        <a:rPr lang="fr-CH" b="1" dirty="0"/>
                         <a:t>Base de données</a:t>
                       </a:r>
                     </a:p>
@@ -6909,8 +7159,8 @@
                     <a:lstStyle/>
                     <a:p>
                       <a:r>
-                        <a:rPr lang="fr-CH" dirty="0"/>
-                        <a:t>Interface utilisateur graphique</a:t>
+                        <a:rPr lang="fr-CH" b="1" dirty="0"/>
+                        <a:t>Interface graphique</a:t>
                       </a:r>
                     </a:p>
                   </a:txBody>
@@ -6944,7 +7194,7 @@
                     <a:lstStyle/>
                     <a:p>
                       <a:r>
-                        <a:rPr lang="fr-CH" dirty="0"/>
+                        <a:rPr lang="fr-CH" b="1" dirty="0"/>
                         <a:t>Fichier JSON</a:t>
                       </a:r>
                     </a:p>
@@ -6978,8 +7228,8 @@
                     <a:lstStyle/>
                     <a:p>
                       <a:r>
-                        <a:rPr lang="fr-CH" dirty="0"/>
-                        <a:t>Parser un SVG</a:t>
+                        <a:rPr lang="fr-CH" b="1" dirty="0"/>
+                        <a:t>Parseur SVG</a:t>
                       </a:r>
                     </a:p>
                   </a:txBody>
@@ -7012,8 +7262,8 @@
                     <a:lstStyle/>
                     <a:p>
                       <a:r>
-                        <a:rPr lang="fr-CH" dirty="0"/>
-                        <a:t>Parser un ICS</a:t>
+                        <a:rPr lang="fr-CH" b="1" dirty="0"/>
+                        <a:t>Parseur ICS</a:t>
                       </a:r>
                     </a:p>
                   </a:txBody>
@@ -7047,8 +7297,8 @@
                     <a:lstStyle/>
                     <a:p>
                       <a:r>
-                        <a:rPr lang="fr-CH" dirty="0"/>
-                        <a:t>Parser un XML</a:t>
+                        <a:rPr lang="fr-CH" b="1" dirty="0"/>
+                        <a:t>Parseur XML</a:t>
                       </a:r>
                     </a:p>
                   </a:txBody>
@@ -7092,302 +7342,6 @@
 </p:sld>
 </file>
 
-<file path=ppt/slides/slide4.xml><?xml version="1.0" encoding="utf-8"?>
-<p:sld xmlns:a="http://schemas.openxmlformats.org/drawingml/2006/main" xmlns:r="http://schemas.openxmlformats.org/officeDocument/2006/relationships" xmlns:p="http://schemas.openxmlformats.org/presentationml/2006/main">
-  <p:cSld>
-    <p:spTree>
-      <p:nvGrpSpPr>
-        <p:cNvPr id="1" name=""/>
-        <p:cNvGrpSpPr/>
-        <p:nvPr/>
-      </p:nvGrpSpPr>
-      <p:grpSpPr>
-        <a:xfrm>
-          <a:off x="0" y="0"/>
-          <a:ext cx="0" cy="0"/>
-          <a:chOff x="0" y="0"/>
-          <a:chExt cx="0" cy="0"/>
-        </a:xfrm>
-      </p:grpSpPr>
-      <p:sp>
-        <p:nvSpPr>
-          <p:cNvPr id="2" name="Titre 1">
-            <a:extLst>
-              <a:ext uri="{FF2B5EF4-FFF2-40B4-BE49-F238E27FC236}">
-                <a16:creationId xmlns:a16="http://schemas.microsoft.com/office/drawing/2014/main" id="{D0449A1E-829E-4083-9EA0-63A6EA8156DF}"/>
-              </a:ext>
-            </a:extLst>
-          </p:cNvPr>
-          <p:cNvSpPr>
-            <a:spLocks noGrp="1"/>
-          </p:cNvSpPr>
-          <p:nvPr>
-            <p:ph type="title"/>
-          </p:nvPr>
-        </p:nvSpPr>
-        <p:spPr/>
-        <p:txBody>
-          <a:bodyPr/>
-          <a:lstStyle/>
-          <a:p>
-            <a:r>
-              <a:rPr lang="fr-CH" dirty="0"/>
-              <a:t>Modèle de données utilisé</a:t>
-            </a:r>
-          </a:p>
-        </p:txBody>
-      </p:sp>
-      <p:graphicFrame>
-        <p:nvGraphicFramePr>
-          <p:cNvPr id="4" name="Espace réservé du contenu 3">
-            <a:extLst>
-              <a:ext uri="{FF2B5EF4-FFF2-40B4-BE49-F238E27FC236}">
-                <a16:creationId xmlns:a16="http://schemas.microsoft.com/office/drawing/2014/main" id="{62F2D78C-A8DE-47F9-9F2F-DC4F417F6C12}"/>
-              </a:ext>
-            </a:extLst>
-          </p:cNvPr>
-          <p:cNvGraphicFramePr>
-            <a:graphicFrameLocks noGrp="1"/>
-          </p:cNvGraphicFramePr>
-          <p:nvPr>
-            <p:ph idx="1"/>
-            <p:extLst>
-              <p:ext uri="{D42A27DB-BD31-4B8C-83A1-F6EECF244321}">
-                <p14:modId xmlns:p14="http://schemas.microsoft.com/office/powerpoint/2010/main" val="692551725"/>
-              </p:ext>
-            </p:extLst>
-          </p:nvPr>
-        </p:nvGraphicFramePr>
-        <p:xfrm>
-          <a:off x="677068" y="2348750"/>
-          <a:ext cx="6348414" cy="3240000"/>
-        </p:xfrm>
-        <a:graphic>
-          <a:graphicData uri="http://schemas.openxmlformats.org/drawingml/2006/table">
-            <a:tbl>
-              <a:tblPr bandRow="1">
-                <a:tableStyleId>{5C22544A-7EE6-4342-B048-85BDC9FD1C3A}</a:tableStyleId>
-              </a:tblPr>
-              <a:tblGrid>
-                <a:gridCol w="3174207">
-                  <a:extLst>
-                    <a:ext uri="{9D8B030D-6E8A-4147-A177-3AD203B41FA5}">
-                      <a16:colId xmlns:a16="http://schemas.microsoft.com/office/drawing/2014/main" val="2752126569"/>
-                    </a:ext>
-                  </a:extLst>
-                </a:gridCol>
-                <a:gridCol w="3174207">
-                  <a:extLst>
-                    <a:ext uri="{9D8B030D-6E8A-4147-A177-3AD203B41FA5}">
-                      <a16:colId xmlns:a16="http://schemas.microsoft.com/office/drawing/2014/main" val="1997517721"/>
-                    </a:ext>
-                  </a:extLst>
-                </a:gridCol>
-              </a:tblGrid>
-              <a:tr h="648000">
-                <a:tc>
-                  <a:txBody>
-                    <a:bodyPr/>
-                    <a:lstStyle/>
-                    <a:p>
-                      <a:pPr algn="l"/>
-                      <a:r>
-                        <a:rPr lang="fr-CH" dirty="0"/>
-                        <a:t>Calendrier</a:t>
-                      </a:r>
-                    </a:p>
-                    <a:p>
-                      <a:pPr algn="l"/>
-                      <a:r>
-                        <a:rPr lang="fr-CH" dirty="0"/>
-                        <a:t>(Raw data)</a:t>
-                      </a:r>
-                    </a:p>
-                  </a:txBody>
-                  <a:tcPr anchor="ctr"/>
-                </a:tc>
-                <a:tc>
-                  <a:txBody>
-                    <a:bodyPr/>
-                    <a:lstStyle/>
-                    <a:p>
-                      <a:pPr algn="r"/>
-                      <a:r>
-                        <a:rPr lang="fr-CH" dirty="0"/>
-                        <a:t>ICS</a:t>
-                      </a:r>
-                    </a:p>
-                  </a:txBody>
-                  <a:tcPr anchor="ctr"/>
-                </a:tc>
-                <a:extLst>
-                  <a:ext uri="{0D108BD9-81ED-4DB2-BD59-A6C34878D82A}">
-                    <a16:rowId xmlns:a16="http://schemas.microsoft.com/office/drawing/2014/main" val="3692782782"/>
-                  </a:ext>
-                </a:extLst>
-              </a:tr>
-              <a:tr h="648000">
-                <a:tc>
-                  <a:txBody>
-                    <a:bodyPr/>
-                    <a:lstStyle/>
-                    <a:p>
-                      <a:pPr algn="l"/>
-                      <a:r>
-                        <a:rPr lang="fr-CH" dirty="0"/>
-                        <a:t>Communication client serveur</a:t>
-                      </a:r>
-                    </a:p>
-                  </a:txBody>
-                  <a:tcPr anchor="ctr"/>
-                </a:tc>
-                <a:tc>
-                  <a:txBody>
-                    <a:bodyPr/>
-                    <a:lstStyle/>
-                    <a:p>
-                      <a:pPr algn="r"/>
-                      <a:r>
-                        <a:rPr lang="fr-CH" dirty="0"/>
-                        <a:t>JSON</a:t>
-                      </a:r>
-                    </a:p>
-                  </a:txBody>
-                  <a:tcPr anchor="ctr"/>
-                </a:tc>
-                <a:extLst>
-                  <a:ext uri="{0D108BD9-81ED-4DB2-BD59-A6C34878D82A}">
-                    <a16:rowId xmlns:a16="http://schemas.microsoft.com/office/drawing/2014/main" val="2593279772"/>
-                  </a:ext>
-                </a:extLst>
-              </a:tr>
-              <a:tr h="648000">
-                <a:tc>
-                  <a:txBody>
-                    <a:bodyPr/>
-                    <a:lstStyle/>
-                    <a:p>
-                      <a:pPr algn="l"/>
-                      <a:r>
-                        <a:rPr lang="fr-CH" dirty="0"/>
-                        <a:t>Interface graphique</a:t>
-                      </a:r>
-                    </a:p>
-                  </a:txBody>
-                  <a:tcPr anchor="ctr"/>
-                </a:tc>
-                <a:tc>
-                  <a:txBody>
-                    <a:bodyPr/>
-                    <a:lstStyle/>
-                    <a:p>
-                      <a:pPr algn="r"/>
-                      <a:r>
-                        <a:rPr lang="fr-CH" dirty="0"/>
-                        <a:t>FXML</a:t>
-                      </a:r>
-                    </a:p>
-                  </a:txBody>
-                  <a:tcPr anchor="ctr"/>
-                </a:tc>
-                <a:extLst>
-                  <a:ext uri="{0D108BD9-81ED-4DB2-BD59-A6C34878D82A}">
-                    <a16:rowId xmlns:a16="http://schemas.microsoft.com/office/drawing/2014/main" val="2799125449"/>
-                  </a:ext>
-                </a:extLst>
-              </a:tr>
-              <a:tr h="648000">
-                <a:tc>
-                  <a:txBody>
-                    <a:bodyPr/>
-                    <a:lstStyle/>
-                    <a:p>
-                      <a:pPr algn="l"/>
-                      <a:r>
-                        <a:rPr lang="fr-CH" dirty="0"/>
-                        <a:t>Impression des données</a:t>
-                      </a:r>
-                    </a:p>
-                  </a:txBody>
-                  <a:tcPr anchor="ctr"/>
-                </a:tc>
-                <a:tc>
-                  <a:txBody>
-                    <a:bodyPr/>
-                    <a:lstStyle/>
-                    <a:p>
-                      <a:pPr algn="r"/>
-                      <a:r>
-                        <a:rPr lang="fr-CH" dirty="0"/>
-                        <a:t>TXT</a:t>
-                      </a:r>
-                    </a:p>
-                  </a:txBody>
-                  <a:tcPr anchor="ctr"/>
-                </a:tc>
-                <a:extLst>
-                  <a:ext uri="{0D108BD9-81ED-4DB2-BD59-A6C34878D82A}">
-                    <a16:rowId xmlns:a16="http://schemas.microsoft.com/office/drawing/2014/main" val="1669240110"/>
-                  </a:ext>
-                </a:extLst>
-              </a:tr>
-              <a:tr h="648000">
-                <a:tc>
-                  <a:txBody>
-                    <a:bodyPr/>
-                    <a:lstStyle/>
-                    <a:p>
-                      <a:pPr algn="l"/>
-                      <a:r>
-                        <a:rPr lang="fr-CH" dirty="0"/>
-                        <a:t>Plan du </a:t>
-                      </a:r>
-                      <a:r>
-                        <a:rPr lang="fr-CH" dirty="0" err="1"/>
-                        <a:t>batiment</a:t>
-                      </a:r>
-                      <a:endParaRPr lang="fr-CH" dirty="0"/>
-                    </a:p>
-                  </a:txBody>
-                  <a:tcPr anchor="ctr"/>
-                </a:tc>
-                <a:tc>
-                  <a:txBody>
-                    <a:bodyPr/>
-                    <a:lstStyle/>
-                    <a:p>
-                      <a:pPr algn="r"/>
-                      <a:r>
-                        <a:rPr lang="fr-CH" dirty="0"/>
-                        <a:t>SVG</a:t>
-                      </a:r>
-                    </a:p>
-                  </a:txBody>
-                  <a:tcPr anchor="ctr"/>
-                </a:tc>
-                <a:extLst>
-                  <a:ext uri="{0D108BD9-81ED-4DB2-BD59-A6C34878D82A}">
-                    <a16:rowId xmlns:a16="http://schemas.microsoft.com/office/drawing/2014/main" val="1357869192"/>
-                  </a:ext>
-                </a:extLst>
-              </a:tr>
-            </a:tbl>
-          </a:graphicData>
-        </a:graphic>
-      </p:graphicFrame>
-    </p:spTree>
-    <p:extLst>
-      <p:ext uri="{BB962C8B-B14F-4D97-AF65-F5344CB8AC3E}">
-        <p14:creationId xmlns:p14="http://schemas.microsoft.com/office/powerpoint/2010/main" val="2397979562"/>
-      </p:ext>
-    </p:extLst>
-  </p:cSld>
-  <p:clrMapOvr>
-    <a:masterClrMapping/>
-  </p:clrMapOvr>
-</p:sld>
-</file>
-
 <file path=ppt/slides/slide5.xml><?xml version="1.0" encoding="utf-8"?>
 <p:sld xmlns:a="http://schemas.openxmlformats.org/drawingml/2006/main" xmlns:r="http://schemas.openxmlformats.org/officeDocument/2006/relationships" xmlns:p="http://schemas.openxmlformats.org/presentationml/2006/main">
   <p:cSld>
@@ -7428,7 +7382,7 @@
           <a:p>
             <a:r>
               <a:rPr lang="fr-CH" dirty="0"/>
-              <a:t>Base de donnée</a:t>
+              <a:t>Base de données</a:t>
             </a:r>
           </a:p>
         </p:txBody>
@@ -7463,8 +7417,8 @@
         </p:blipFill>
         <p:spPr>
           <a:xfrm>
-            <a:off x="609599" y="2349725"/>
-            <a:ext cx="6875054" cy="3600000"/>
+            <a:off x="237002" y="2154621"/>
+            <a:ext cx="7247651" cy="3795104"/>
           </a:xfrm>
         </p:spPr>
       </p:pic>
@@ -7660,13 +7614,13 @@
           <a:p>
             <a:r>
               <a:rPr lang="fr-CH" dirty="0"/>
-              <a:t>Problème au sein du groupe</a:t>
+              <a:t>Problèmes au sein du groupe</a:t>
             </a:r>
           </a:p>
           <a:p>
             <a:r>
               <a:rPr lang="fr-CH" dirty="0"/>
-              <a:t>Difficulté techniques rencontrées</a:t>
+              <a:t>Difficultés techniques rencontrées</a:t>
             </a:r>
           </a:p>
           <a:p>
@@ -7768,7 +7722,7 @@
         <p:spPr>
           <a:xfrm>
             <a:off x="677418" y="2054004"/>
-            <a:ext cx="6347714" cy="4191442"/>
+            <a:ext cx="6753396" cy="4191442"/>
           </a:xfrm>
         </p:spPr>
         <p:txBody>
@@ -7784,7 +7738,7 @@
             </a:pPr>
             <a:r>
               <a:rPr lang="fr-CH" sz="2000" dirty="0"/>
-              <a:t>Parser ICS		:	</a:t>
+              <a:t>Parseur ICS	:	</a:t>
             </a:r>
             <a:r>
               <a:rPr lang="fr-CH" sz="2000" dirty="0">
@@ -7860,7 +7814,39 @@
                   <a:schemeClr val="accent6"/>
                 </a:solidFill>
               </a:rPr>
-              <a:t>WIP</a:t>
+              <a:t>WIP (</a:t>
+            </a:r>
+            <a:r>
+              <a:rPr lang="fr-CH" sz="1800" dirty="0" err="1">
+                <a:solidFill>
+                  <a:schemeClr val="accent6"/>
+                </a:solidFill>
+              </a:rPr>
+              <a:t>work</a:t>
+            </a:r>
+            <a:r>
+              <a:rPr lang="fr-CH" sz="1800" dirty="0">
+                <a:solidFill>
+                  <a:schemeClr val="accent6"/>
+                </a:solidFill>
+              </a:rPr>
+              <a:t> in </a:t>
+            </a:r>
+            <a:r>
+              <a:rPr lang="fr-CH" sz="1800" dirty="0" err="1">
+                <a:solidFill>
+                  <a:schemeClr val="accent6"/>
+                </a:solidFill>
+              </a:rPr>
+              <a:t>progress</a:t>
+            </a:r>
+            <a:r>
+              <a:rPr lang="fr-CH" sz="1800" dirty="0">
+                <a:solidFill>
+                  <a:schemeClr val="accent6"/>
+                </a:solidFill>
+              </a:rPr>
+              <a:t>)</a:t>
             </a:r>
           </a:p>
           <a:p>
@@ -8064,7 +8050,7 @@
           <a:p>
             <a:r>
               <a:rPr lang="fr-CH" dirty="0"/>
-              <a:t>Avis divergent motivés par de bons arguments</a:t>
+              <a:t>Avis divergents motivés par de bons arguments</a:t>
             </a:r>
           </a:p>
           <a:p>

</xml_diff>